<commit_message>
corrected typo in prezi
</commit_message>
<xml_diff>
--- a/Präsentationen/Abschlusspräsentation/Chessmaster_Abschluss.pptx
+++ b/Präsentationen/Abschlusspräsentation/Chessmaster_Abschluss.pptx
@@ -5946,7 +5946,7 @@
           <a:p>
             <a:fld id="{5769E01E-DC72-4D6C-91B9-3199DD89BCD0}" type="datetimeFigureOut">
               <a:rPr lang="de-DE" smtClean="0"/>
-              <a:t>17.07.2020</a:t>
+              <a:t>19.07.2020</a:t>
             </a:fld>
             <a:endParaRPr lang="de-DE"/>
           </a:p>
@@ -6144,7 +6144,7 @@
           <a:p>
             <a:fld id="{5769E01E-DC72-4D6C-91B9-3199DD89BCD0}" type="datetimeFigureOut">
               <a:rPr lang="de-DE" smtClean="0"/>
-              <a:t>17.07.2020</a:t>
+              <a:t>19.07.2020</a:t>
             </a:fld>
             <a:endParaRPr lang="de-DE"/>
           </a:p>
@@ -6352,7 +6352,7 @@
           <a:p>
             <a:fld id="{5769E01E-DC72-4D6C-91B9-3199DD89BCD0}" type="datetimeFigureOut">
               <a:rPr lang="de-DE" smtClean="0"/>
-              <a:t>17.07.2020</a:t>
+              <a:t>19.07.2020</a:t>
             </a:fld>
             <a:endParaRPr lang="de-DE"/>
           </a:p>
@@ -6550,7 +6550,7 @@
           <a:p>
             <a:fld id="{5769E01E-DC72-4D6C-91B9-3199DD89BCD0}" type="datetimeFigureOut">
               <a:rPr lang="de-DE" smtClean="0"/>
-              <a:t>17.07.2020</a:t>
+              <a:t>19.07.2020</a:t>
             </a:fld>
             <a:endParaRPr lang="de-DE"/>
           </a:p>
@@ -6825,7 +6825,7 @@
           <a:p>
             <a:fld id="{5769E01E-DC72-4D6C-91B9-3199DD89BCD0}" type="datetimeFigureOut">
               <a:rPr lang="de-DE" smtClean="0"/>
-              <a:t>17.07.2020</a:t>
+              <a:t>19.07.2020</a:t>
             </a:fld>
             <a:endParaRPr lang="de-DE"/>
           </a:p>
@@ -7090,7 +7090,7 @@
           <a:p>
             <a:fld id="{5769E01E-DC72-4D6C-91B9-3199DD89BCD0}" type="datetimeFigureOut">
               <a:rPr lang="de-DE" smtClean="0"/>
-              <a:t>17.07.2020</a:t>
+              <a:t>19.07.2020</a:t>
             </a:fld>
             <a:endParaRPr lang="de-DE"/>
           </a:p>
@@ -7502,7 +7502,7 @@
           <a:p>
             <a:fld id="{5769E01E-DC72-4D6C-91B9-3199DD89BCD0}" type="datetimeFigureOut">
               <a:rPr lang="de-DE" smtClean="0"/>
-              <a:t>17.07.2020</a:t>
+              <a:t>19.07.2020</a:t>
             </a:fld>
             <a:endParaRPr lang="de-DE"/>
           </a:p>
@@ -7643,7 +7643,7 @@
           <a:p>
             <a:fld id="{5769E01E-DC72-4D6C-91B9-3199DD89BCD0}" type="datetimeFigureOut">
               <a:rPr lang="de-DE" smtClean="0"/>
-              <a:t>17.07.2020</a:t>
+              <a:t>19.07.2020</a:t>
             </a:fld>
             <a:endParaRPr lang="de-DE"/>
           </a:p>
@@ -7756,7 +7756,7 @@
           <a:p>
             <a:fld id="{5769E01E-DC72-4D6C-91B9-3199DD89BCD0}" type="datetimeFigureOut">
               <a:rPr lang="de-DE" smtClean="0"/>
-              <a:t>17.07.2020</a:t>
+              <a:t>19.07.2020</a:t>
             </a:fld>
             <a:endParaRPr lang="de-DE"/>
           </a:p>
@@ -8067,7 +8067,7 @@
           <a:p>
             <a:fld id="{5769E01E-DC72-4D6C-91B9-3199DD89BCD0}" type="datetimeFigureOut">
               <a:rPr lang="de-DE" smtClean="0"/>
-              <a:t>17.07.2020</a:t>
+              <a:t>19.07.2020</a:t>
             </a:fld>
             <a:endParaRPr lang="de-DE"/>
           </a:p>
@@ -8355,7 +8355,7 @@
           <a:p>
             <a:fld id="{5769E01E-DC72-4D6C-91B9-3199DD89BCD0}" type="datetimeFigureOut">
               <a:rPr lang="de-DE" smtClean="0"/>
-              <a:t>17.07.2020</a:t>
+              <a:t>19.07.2020</a:t>
             </a:fld>
             <a:endParaRPr lang="de-DE"/>
           </a:p>
@@ -8596,7 +8596,7 @@
           <a:p>
             <a:fld id="{5769E01E-DC72-4D6C-91B9-3199DD89BCD0}" type="datetimeFigureOut">
               <a:rPr lang="de-DE" smtClean="0"/>
-              <a:t>17.07.2020</a:t>
+              <a:t>19.07.2020</a:t>
             </a:fld>
             <a:endParaRPr lang="de-DE"/>
           </a:p>
@@ -10936,7 +10936,15 @@
             <a:pPr lvl="1" fontAlgn="base"/>
             <a:r>
               <a:rPr lang="de-DE" dirty="0"/>
-              <a:t>6 Conv2D Layer</a:t>
+              <a:t>7</a:t>
+            </a:r>
+            <a:r>
+              <a:rPr lang="de-DE"/>
+              <a:t> </a:t>
+            </a:r>
+            <a:r>
+              <a:rPr lang="de-DE" dirty="0"/>
+              <a:t>Conv2D Layer</a:t>
             </a:r>
           </a:p>
           <a:p>
@@ -19315,7 +19323,7 @@
         </p:spPr>
         <p:txBody>
           <a:bodyPr>
-            <a:normAutofit fontScale="92500" lnSpcReduction="20000"/>
+            <a:normAutofit lnSpcReduction="10000"/>
           </a:bodyPr>
           <a:lstStyle/>
           <a:p>
@@ -19354,25 +19362,6 @@
               <a:rPr lang="de-DE" dirty="0"/>
               <a:t>)</a:t>
             </a:r>
-          </a:p>
-          <a:p>
-            <a:pPr fontAlgn="base"/>
-            <a:r>
-              <a:rPr lang="de-DE" dirty="0"/>
-              <a:t>Output</a:t>
-            </a:r>
-          </a:p>
-          <a:p>
-            <a:pPr lvl="1" fontAlgn="base"/>
-            <a:r>
-              <a:rPr lang="de-DE" dirty="0"/>
-              <a:t>Wert der </a:t>
-            </a:r>
-            <a:r>
-              <a:rPr lang="de-DE" dirty="0" err="1"/>
-              <a:t>Node</a:t>
-            </a:r>
-            <a:endParaRPr lang="de-DE" dirty="0"/>
           </a:p>
           <a:p>
             <a:pPr fontAlgn="base"/>
@@ -19834,18 +19823,18 @@
 </file>
 
 <file path=customXml/item1.xml><?xml version="1.0" encoding="utf-8"?>
-<p:properties xmlns:p="http://schemas.microsoft.com/office/2006/metadata/properties" xmlns:xsi="http://www.w3.org/2001/XMLSchema-instance" xmlns:pc="http://schemas.microsoft.com/office/infopath/2007/PartnerControls">
-  <documentManagement/>
-</p:properties>
-</file>
-
-<file path=customXml/item2.xml><?xml version="1.0" encoding="utf-8"?>
 <?mso-contentType ?>
 <FormTemplates xmlns="http://schemas.microsoft.com/sharepoint/v3/contenttype/forms">
   <Display>DocumentLibraryForm</Display>
   <Edit>DocumentLibraryForm</Edit>
   <New>DocumentLibraryForm</New>
 </FormTemplates>
+</file>
+
+<file path=customXml/item2.xml><?xml version="1.0" encoding="utf-8"?>
+<p:properties xmlns:p="http://schemas.microsoft.com/office/2006/metadata/properties" xmlns:xsi="http://www.w3.org/2001/XMLSchema-instance" xmlns:pc="http://schemas.microsoft.com/office/infopath/2007/PartnerControls">
+  <documentManagement/>
+</p:properties>
 </file>
 
 <file path=customXml/item3.xml><?xml version="1.0" encoding="utf-8"?>
@@ -20066,6 +20055,14 @@
 </file>
 
 <file path=customXml/itemProps1.xml><?xml version="1.0" encoding="utf-8"?>
+<ds:datastoreItem xmlns:ds="http://schemas.openxmlformats.org/officeDocument/2006/customXml" ds:itemID="{CE3F8EDD-2F21-4FBF-BC71-777BF1DA3C2E}">
+  <ds:schemaRefs>
+    <ds:schemaRef ds:uri="http://schemas.microsoft.com/sharepoint/v3/contenttype/forms"/>
+  </ds:schemaRefs>
+</ds:datastoreItem>
+</file>
+
+<file path=customXml/itemProps2.xml><?xml version="1.0" encoding="utf-8"?>
 <ds:datastoreItem xmlns:ds="http://schemas.openxmlformats.org/officeDocument/2006/customXml" ds:itemID="{FB44E75D-7923-4273-AB76-3459B30E8DF4}">
   <ds:schemaRefs>
     <ds:schemaRef ds:uri="http://schemas.microsoft.com/office/2006/metadata/properties"/>
@@ -20078,14 +20075,6 @@
     <ds:schemaRef ds:uri="http://schemas.microsoft.com/office/infopath/2007/PartnerControls"/>
     <ds:schemaRef ds:uri="http://www.w3.org/XML/1998/namespace"/>
     <ds:schemaRef ds:uri="http://purl.org/dc/dcmitype/"/>
-  </ds:schemaRefs>
-</ds:datastoreItem>
-</file>
-
-<file path=customXml/itemProps2.xml><?xml version="1.0" encoding="utf-8"?>
-<ds:datastoreItem xmlns:ds="http://schemas.openxmlformats.org/officeDocument/2006/customXml" ds:itemID="{CE3F8EDD-2F21-4FBF-BC71-777BF1DA3C2E}">
-  <ds:schemaRefs>
-    <ds:schemaRef ds:uri="http://schemas.microsoft.com/sharepoint/v3/contenttype/forms"/>
   </ds:schemaRefs>
 </ds:datastoreItem>
 </file>

</xml_diff>